<commit_message>
Revert "Merge branch 'main' of https://github.com/LegitMarkus/multiflexlbkv"
This reverts commit 29bb59742c2095adc95a6c97c44854055c3b7002, reversing
changes made to 7c0b549c490f382548d87b7ffc6204bd78c62c2b.
</commit_message>
<xml_diff>
--- a/Präsentation/MultiFlex.pptx
+++ b/Präsentation/MultiFlex.pptx
@@ -5,10 +5,10 @@
     <p:sldMasterId id="2147483696" r:id="rId4"/>
   </p:sldMasterIdLst>
   <p:notesMasterIdLst>
-    <p:notesMasterId r:id="rId11"/>
+    <p:notesMasterId r:id="rId12"/>
   </p:notesMasterIdLst>
   <p:handoutMasterIdLst>
-    <p:handoutMasterId r:id="rId12"/>
+    <p:handoutMasterId r:id="rId13"/>
   </p:handoutMasterIdLst>
   <p:sldIdLst>
     <p:sldId id="306" r:id="rId5"/>
@@ -16,7 +16,8 @@
     <p:sldId id="308" r:id="rId7"/>
     <p:sldId id="310" r:id="rId8"/>
     <p:sldId id="314" r:id="rId9"/>
-    <p:sldId id="312" r:id="rId10"/>
+    <p:sldId id="316" r:id="rId10"/>
+    <p:sldId id="312" r:id="rId11"/>
   </p:sldIdLst>
   <p:sldSz cx="12192000" cy="6858000"/>
   <p:notesSz cx="6858000" cy="9144000"/>
@@ -4022,7 +4023,7 @@
             </a:r>
             <a:r>
               <a:rPr lang="de-DE" dirty="0" err="1"/>
-              <a:t>Lagerverwaltungs</a:t>
+              <a:t>Verwaltungs</a:t>
             </a:r>
             <a:r>
               <a:rPr lang="de-DE" dirty="0"/>
@@ -4229,7 +4230,10 @@
           <a:bodyPr/>
           <a:lstStyle/>
           <a:p>
-            <a:endParaRPr lang="de-DE"/>
+            <a:r>
+              <a:rPr lang="de-AT" dirty="0"/>
+              <a:t>Als Technologien Haben wie … verwendet</a:t>
+            </a:r>
           </a:p>
         </p:txBody>
       </p:sp>
@@ -4250,8 +4254,93 @@
           <a:p>
             <a:pPr rtl="0"/>
             <a:fld id="{D5939589-3E79-4C82-AA4A-FE78234FAA59}" type="slidenum">
+              <a:rPr lang="de-DE" noProof="0" smtClean="0"/>
+              <a:t>6</a:t>
+            </a:fld>
+            <a:endParaRPr lang="de-DE" noProof="0"/>
+          </a:p>
+        </p:txBody>
+      </p:sp>
+    </p:spTree>
+    <p:extLst>
+      <p:ext uri="{BB962C8B-B14F-4D97-AF65-F5344CB8AC3E}">
+        <p14:creationId xmlns:p14="http://schemas.microsoft.com/office/powerpoint/2010/main" val="2190886567"/>
+      </p:ext>
+    </p:extLst>
+  </p:cSld>
+  <p:clrMapOvr>
+    <a:masterClrMapping/>
+  </p:clrMapOvr>
+</p:notes>
+</file>
+
+<file path=ppt/notesSlides/notesSlide6.xml><?xml version="1.0" encoding="utf-8"?>
+<p:notes xmlns:a="http://schemas.openxmlformats.org/drawingml/2006/main" xmlns:r="http://schemas.openxmlformats.org/officeDocument/2006/relationships" xmlns:p="http://schemas.openxmlformats.org/presentationml/2006/main">
+  <p:cSld>
+    <p:spTree>
+      <p:nvGrpSpPr>
+        <p:cNvPr id="1" name=""/>
+        <p:cNvGrpSpPr/>
+        <p:nvPr/>
+      </p:nvGrpSpPr>
+      <p:grpSpPr>
+        <a:xfrm>
+          <a:off x="0" y="0"/>
+          <a:ext cx="0" cy="0"/>
+          <a:chOff x="0" y="0"/>
+          <a:chExt cx="0" cy="0"/>
+        </a:xfrm>
+      </p:grpSpPr>
+      <p:sp>
+        <p:nvSpPr>
+          <p:cNvPr id="2" name="Folienbildplatzhalter 1"/>
+          <p:cNvSpPr>
+            <a:spLocks noGrp="1" noRot="1" noChangeAspect="1"/>
+          </p:cNvSpPr>
+          <p:nvPr>
+            <p:ph type="sldImg"/>
+          </p:nvPr>
+        </p:nvSpPr>
+        <p:spPr/>
+      </p:sp>
+      <p:sp>
+        <p:nvSpPr>
+          <p:cNvPr id="3" name="Notizenplatzhalter 2"/>
+          <p:cNvSpPr>
+            <a:spLocks noGrp="1"/>
+          </p:cNvSpPr>
+          <p:nvPr>
+            <p:ph type="body" idx="1"/>
+          </p:nvPr>
+        </p:nvSpPr>
+        <p:spPr/>
+        <p:txBody>
+          <a:bodyPr/>
+          <a:lstStyle/>
+          <a:p>
+            <a:endParaRPr lang="de-DE" dirty="0"/>
+          </a:p>
+        </p:txBody>
+      </p:sp>
+      <p:sp>
+        <p:nvSpPr>
+          <p:cNvPr id="4" name="Foliennummernplatzhalter 3"/>
+          <p:cNvSpPr>
+            <a:spLocks noGrp="1"/>
+          </p:cNvSpPr>
+          <p:nvPr>
+            <p:ph type="sldNum" sz="quarter" idx="5"/>
+          </p:nvPr>
+        </p:nvSpPr>
+        <p:spPr/>
+        <p:txBody>
+          <a:bodyPr/>
+          <a:lstStyle/>
+          <a:p>
+            <a:pPr rtl="0"/>
+            <a:fld id="{D5939589-3E79-4C82-AA4A-FE78234FAA59}" type="slidenum">
               <a:rPr lang="de-DE" smtClean="0"/>
-              <a:t>6</a:t>
+              <a:t>7</a:t>
             </a:fld>
             <a:endParaRPr lang="de-DE"/>
           </a:p>
@@ -16136,6 +16225,436 @@
           <a:chExt cx="0" cy="0"/>
         </a:xfrm>
       </p:grpSpPr>
+      <p:pic>
+        <p:nvPicPr>
+          <p:cNvPr id="1026" name="Picture 2" descr="Image result for docker">
+            <a:extLst>
+              <a:ext uri="{FF2B5EF4-FFF2-40B4-BE49-F238E27FC236}">
+                <a16:creationId xmlns:a16="http://schemas.microsoft.com/office/drawing/2014/main" id="{97B40304-2F3D-FB80-93EE-47DEECF887DE}"/>
+              </a:ext>
+            </a:extLst>
+          </p:cNvPr>
+          <p:cNvPicPr>
+            <a:picLocks noGrp="1" noChangeAspect="1" noChangeArrowheads="1"/>
+          </p:cNvPicPr>
+          <p:nvPr>
+            <p:ph idx="1"/>
+          </p:nvPr>
+        </p:nvPicPr>
+        <p:blipFill>
+          <a:blip r:embed="rId3">
+            <a:extLst>
+              <a:ext uri="{28A0092B-C50C-407E-A947-70E740481C1C}">
+                <a14:useLocalDpi xmlns:a14="http://schemas.microsoft.com/office/drawing/2010/main" val="0"/>
+              </a:ext>
+            </a:extLst>
+          </a:blip>
+          <a:srcRect/>
+          <a:stretch>
+            <a:fillRect/>
+          </a:stretch>
+        </p:blipFill>
+        <p:spPr bwMode="auto">
+          <a:xfrm>
+            <a:off x="574675" y="1990725"/>
+            <a:ext cx="2279650" cy="2279650"/>
+          </a:xfrm>
+          <a:prstGeom prst="rect">
+            <a:avLst/>
+          </a:prstGeom>
+          <a:extLst>
+            <a:ext uri="{909E8E84-426E-40DD-AFC4-6F175D3DCCD1}">
+              <a14:hiddenFill xmlns:a14="http://schemas.microsoft.com/office/drawing/2010/main">
+                <a:solidFill>
+                  <a:srgbClr val="FFFFFF"/>
+                </a:solidFill>
+              </a14:hiddenFill>
+            </a:ext>
+          </a:extLst>
+        </p:spPr>
+      </p:pic>
+      <p:pic>
+        <p:nvPicPr>
+          <p:cNvPr id="1028" name="Picture 4" descr="Microframework Quarkus – ein erster Einblick – The Cattle Crew Blog">
+            <a:extLst>
+              <a:ext uri="{FF2B5EF4-FFF2-40B4-BE49-F238E27FC236}">
+                <a16:creationId xmlns:a16="http://schemas.microsoft.com/office/drawing/2014/main" id="{74F73C4F-CBAF-0275-878E-91D559190417}"/>
+              </a:ext>
+            </a:extLst>
+          </p:cNvPr>
+          <p:cNvPicPr>
+            <a:picLocks noChangeAspect="1" noChangeArrowheads="1"/>
+          </p:cNvPicPr>
+          <p:nvPr/>
+        </p:nvPicPr>
+        <p:blipFill>
+          <a:blip r:embed="rId4">
+            <a:extLst>
+              <a:ext uri="{28A0092B-C50C-407E-A947-70E740481C1C}">
+                <a14:useLocalDpi xmlns:a14="http://schemas.microsoft.com/office/drawing/2010/main" val="0"/>
+              </a:ext>
+            </a:extLst>
+          </a:blip>
+          <a:srcRect/>
+          <a:stretch>
+            <a:fillRect/>
+          </a:stretch>
+        </p:blipFill>
+        <p:spPr bwMode="auto">
+          <a:xfrm>
+            <a:off x="574675" y="4341813"/>
+            <a:ext cx="2279650" cy="1666875"/>
+          </a:xfrm>
+          <a:prstGeom prst="rect">
+            <a:avLst/>
+          </a:prstGeom>
+          <a:extLst>
+            <a:ext uri="{909E8E84-426E-40DD-AFC4-6F175D3DCCD1}">
+              <a14:hiddenFill xmlns:a14="http://schemas.microsoft.com/office/drawing/2010/main">
+                <a:solidFill>
+                  <a:srgbClr val="FFFFFF"/>
+                </a:solidFill>
+              </a14:hiddenFill>
+            </a:ext>
+          </a:extLst>
+        </p:spPr>
+      </p:pic>
+      <p:pic>
+        <p:nvPicPr>
+          <p:cNvPr id="1036" name="Picture 12" descr="Java-Technologie – Wikipedia">
+            <a:extLst>
+              <a:ext uri="{FF2B5EF4-FFF2-40B4-BE49-F238E27FC236}">
+                <a16:creationId xmlns:a16="http://schemas.microsoft.com/office/drawing/2014/main" id="{AEA00D0D-2859-069C-F2A5-114D66C7CBA4}"/>
+              </a:ext>
+            </a:extLst>
+          </p:cNvPr>
+          <p:cNvPicPr>
+            <a:picLocks noChangeAspect="1" noChangeArrowheads="1"/>
+          </p:cNvPicPr>
+          <p:nvPr/>
+        </p:nvPicPr>
+        <p:blipFill>
+          <a:blip r:embed="rId5">
+            <a:extLst>
+              <a:ext uri="{28A0092B-C50C-407E-A947-70E740481C1C}">
+                <a14:useLocalDpi xmlns:a14="http://schemas.microsoft.com/office/drawing/2010/main" val="0"/>
+              </a:ext>
+            </a:extLst>
+          </a:blip>
+          <a:srcRect/>
+          <a:stretch>
+            <a:fillRect/>
+          </a:stretch>
+        </p:blipFill>
+        <p:spPr bwMode="auto">
+          <a:xfrm>
+            <a:off x="2927350" y="1990725"/>
+            <a:ext cx="2084388" cy="4019550"/>
+          </a:xfrm>
+          <a:prstGeom prst="rect">
+            <a:avLst/>
+          </a:prstGeom>
+          <a:extLst>
+            <a:ext uri="{909E8E84-426E-40DD-AFC4-6F175D3DCCD1}">
+              <a14:hiddenFill xmlns:a14="http://schemas.microsoft.com/office/drawing/2010/main">
+                <a:solidFill>
+                  <a:srgbClr val="FFFFFF"/>
+                </a:solidFill>
+              </a14:hiddenFill>
+            </a:ext>
+          </a:extLst>
+        </p:spPr>
+      </p:pic>
+      <p:pic>
+        <p:nvPicPr>
+          <p:cNvPr id="1030" name="Picture 6" descr="Lehrgang: C# Programmierer – Lehrgang Ausbildung, Kurs, Schulung, Training,  Seminar und Ausbildung in Wien und Graz | tecTrain GmbH">
+            <a:extLst>
+              <a:ext uri="{FF2B5EF4-FFF2-40B4-BE49-F238E27FC236}">
+                <a16:creationId xmlns:a16="http://schemas.microsoft.com/office/drawing/2014/main" id="{2CC3E47E-2EC9-EF2C-657A-9ED61A5F0A43}"/>
+              </a:ext>
+            </a:extLst>
+          </p:cNvPr>
+          <p:cNvPicPr>
+            <a:picLocks noChangeAspect="1" noChangeArrowheads="1"/>
+          </p:cNvPicPr>
+          <p:nvPr/>
+        </p:nvPicPr>
+        <p:blipFill>
+          <a:blip r:embed="rId6">
+            <a:extLst>
+              <a:ext uri="{28A0092B-C50C-407E-A947-70E740481C1C}">
+                <a14:useLocalDpi xmlns:a14="http://schemas.microsoft.com/office/drawing/2010/main" val="0"/>
+              </a:ext>
+            </a:extLst>
+          </a:blip>
+          <a:srcRect/>
+          <a:stretch>
+            <a:fillRect/>
+          </a:stretch>
+        </p:blipFill>
+        <p:spPr bwMode="auto">
+          <a:xfrm>
+            <a:off x="5084763" y="1990725"/>
+            <a:ext cx="4019550" cy="4019550"/>
+          </a:xfrm>
+          <a:prstGeom prst="rect">
+            <a:avLst/>
+          </a:prstGeom>
+          <a:extLst>
+            <a:ext uri="{909E8E84-426E-40DD-AFC4-6F175D3DCCD1}">
+              <a14:hiddenFill xmlns:a14="http://schemas.microsoft.com/office/drawing/2010/main">
+                <a:solidFill>
+                  <a:srgbClr val="FFFFFF"/>
+                </a:solidFill>
+              </a14:hiddenFill>
+            </a:ext>
+          </a:extLst>
+        </p:spPr>
+      </p:pic>
+      <p:pic>
+        <p:nvPicPr>
+          <p:cNvPr id="1034" name="Picture 10" descr="NuGet Gallery | aspnet">
+            <a:extLst>
+              <a:ext uri="{FF2B5EF4-FFF2-40B4-BE49-F238E27FC236}">
+                <a16:creationId xmlns:a16="http://schemas.microsoft.com/office/drawing/2014/main" id="{ABEC3662-8819-F171-1FDB-B80A6DE0C96A}"/>
+              </a:ext>
+            </a:extLst>
+          </p:cNvPr>
+          <p:cNvPicPr>
+            <a:picLocks noChangeAspect="1" noChangeArrowheads="1"/>
+          </p:cNvPicPr>
+          <p:nvPr/>
+        </p:nvPicPr>
+        <p:blipFill>
+          <a:blip r:embed="rId7">
+            <a:extLst>
+              <a:ext uri="{28A0092B-C50C-407E-A947-70E740481C1C}">
+                <a14:useLocalDpi xmlns:a14="http://schemas.microsoft.com/office/drawing/2010/main" val="0"/>
+              </a:ext>
+            </a:extLst>
+          </a:blip>
+          <a:srcRect/>
+          <a:stretch>
+            <a:fillRect/>
+          </a:stretch>
+        </p:blipFill>
+        <p:spPr bwMode="auto">
+          <a:xfrm>
+            <a:off x="9178925" y="1990725"/>
+            <a:ext cx="2166938" cy="2168525"/>
+          </a:xfrm>
+          <a:prstGeom prst="rect">
+            <a:avLst/>
+          </a:prstGeom>
+          <a:extLst>
+            <a:ext uri="{909E8E84-426E-40DD-AFC4-6F175D3DCCD1}">
+              <a14:hiddenFill xmlns:a14="http://schemas.microsoft.com/office/drawing/2010/main">
+                <a:solidFill>
+                  <a:srgbClr val="FFFFFF"/>
+                </a:solidFill>
+              </a14:hiddenFill>
+            </a:ext>
+          </a:extLst>
+        </p:spPr>
+      </p:pic>
+      <p:pic>
+        <p:nvPicPr>
+          <p:cNvPr id="1032" name="Picture 8" descr="Bootstrap · The most popular HTML, CSS, and JS library in the world.">
+            <a:extLst>
+              <a:ext uri="{FF2B5EF4-FFF2-40B4-BE49-F238E27FC236}">
+                <a16:creationId xmlns:a16="http://schemas.microsoft.com/office/drawing/2014/main" id="{4354E452-40E7-6ADD-326D-29A66E424876}"/>
+              </a:ext>
+            </a:extLst>
+          </p:cNvPr>
+          <p:cNvPicPr>
+            <a:picLocks noChangeAspect="1" noChangeArrowheads="1"/>
+          </p:cNvPicPr>
+          <p:nvPr/>
+        </p:nvPicPr>
+        <p:blipFill>
+          <a:blip r:embed="rId8">
+            <a:extLst>
+              <a:ext uri="{28A0092B-C50C-407E-A947-70E740481C1C}">
+                <a14:useLocalDpi xmlns:a14="http://schemas.microsoft.com/office/drawing/2010/main" val="0"/>
+              </a:ext>
+            </a:extLst>
+          </a:blip>
+          <a:srcRect/>
+          <a:stretch>
+            <a:fillRect/>
+          </a:stretch>
+        </p:blipFill>
+        <p:spPr bwMode="auto">
+          <a:xfrm>
+            <a:off x="9178925" y="4232275"/>
+            <a:ext cx="2166938" cy="1778000"/>
+          </a:xfrm>
+          <a:prstGeom prst="rect">
+            <a:avLst/>
+          </a:prstGeom>
+          <a:extLst>
+            <a:ext uri="{909E8E84-426E-40DD-AFC4-6F175D3DCCD1}">
+              <a14:hiddenFill xmlns:a14="http://schemas.microsoft.com/office/drawing/2010/main">
+                <a:solidFill>
+                  <a:srgbClr val="FFFFFF"/>
+                </a:solidFill>
+              </a14:hiddenFill>
+            </a:ext>
+          </a:extLst>
+        </p:spPr>
+      </p:pic>
+      <p:sp>
+        <p:nvSpPr>
+          <p:cNvPr id="2" name="Titel 1">
+            <a:extLst>
+              <a:ext uri="{FF2B5EF4-FFF2-40B4-BE49-F238E27FC236}">
+                <a16:creationId xmlns:a16="http://schemas.microsoft.com/office/drawing/2014/main" id="{0BE559A4-EC8A-E351-CC45-74D2A464AD0B}"/>
+              </a:ext>
+            </a:extLst>
+          </p:cNvPr>
+          <p:cNvSpPr>
+            <a:spLocks noGrp="1"/>
+          </p:cNvSpPr>
+          <p:nvPr>
+            <p:ph type="title"/>
+          </p:nvPr>
+        </p:nvSpPr>
+        <p:spPr>
+          <a:xfrm>
+            <a:off x="576072" y="365125"/>
+            <a:ext cx="10771632" cy="1325563"/>
+          </a:xfrm>
+        </p:spPr>
+        <p:txBody>
+          <a:bodyPr anchor="ctr">
+            <a:normAutofit/>
+          </a:bodyPr>
+          <a:lstStyle/>
+          <a:p>
+            <a:r>
+              <a:rPr lang="de-AT" dirty="0"/>
+              <a:t>Technologien</a:t>
+            </a:r>
+            <a:endParaRPr lang="de-AT"/>
+          </a:p>
+        </p:txBody>
+      </p:sp>
+      <p:sp>
+        <p:nvSpPr>
+          <p:cNvPr id="4" name="Datumsplatzhalter 3">
+            <a:extLst>
+              <a:ext uri="{FF2B5EF4-FFF2-40B4-BE49-F238E27FC236}">
+                <a16:creationId xmlns:a16="http://schemas.microsoft.com/office/drawing/2014/main" id="{B9DF2C22-3752-9032-7C0B-A6F9650A32A9}"/>
+              </a:ext>
+            </a:extLst>
+          </p:cNvPr>
+          <p:cNvSpPr>
+            <a:spLocks noGrp="1"/>
+          </p:cNvSpPr>
+          <p:nvPr>
+            <p:ph type="dt" sz="half" idx="10"/>
+          </p:nvPr>
+        </p:nvSpPr>
+        <p:spPr>
+          <a:xfrm>
+            <a:off x="658368" y="6356350"/>
+            <a:ext cx="2743200" cy="365125"/>
+          </a:xfrm>
+        </p:spPr>
+        <p:txBody>
+          <a:bodyPr anchor="ctr">
+            <a:normAutofit/>
+          </a:bodyPr>
+          <a:lstStyle/>
+          <a:p>
+            <a:pPr rtl="0">
+              <a:spcAft>
+                <a:spcPts val="600"/>
+              </a:spcAft>
+            </a:pPr>
+            <a:r>
+              <a:rPr lang="de-DE" noProof="0"/>
+              <a:t>3.9.20XX</a:t>
+            </a:r>
+          </a:p>
+        </p:txBody>
+      </p:sp>
+      <p:sp>
+        <p:nvSpPr>
+          <p:cNvPr id="6" name="Foliennummernplatzhalter 5">
+            <a:extLst>
+              <a:ext uri="{FF2B5EF4-FFF2-40B4-BE49-F238E27FC236}">
+                <a16:creationId xmlns:a16="http://schemas.microsoft.com/office/drawing/2014/main" id="{EE876BD7-2DD6-A08E-0F83-3401518CE54E}"/>
+              </a:ext>
+            </a:extLst>
+          </p:cNvPr>
+          <p:cNvSpPr>
+            <a:spLocks noGrp="1"/>
+          </p:cNvSpPr>
+          <p:nvPr>
+            <p:ph type="sldNum" sz="quarter" idx="12"/>
+          </p:nvPr>
+        </p:nvSpPr>
+        <p:spPr>
+          <a:xfrm>
+            <a:off x="8610600" y="6356350"/>
+            <a:ext cx="2743200" cy="365125"/>
+          </a:xfrm>
+        </p:spPr>
+        <p:txBody>
+          <a:bodyPr anchor="ctr">
+            <a:normAutofit/>
+          </a:bodyPr>
+          <a:lstStyle/>
+          <a:p>
+            <a:pPr rtl="0">
+              <a:spcAft>
+                <a:spcPts val="600"/>
+              </a:spcAft>
+            </a:pPr>
+            <a:fld id="{D8DA9DAA-006C-4F4B-980E-E3DF019B24E2}" type="slidenum">
+              <a:rPr lang="de-DE" noProof="0" smtClean="0"/>
+              <a:pPr rtl="0">
+                <a:spcAft>
+                  <a:spcPts val="600"/>
+                </a:spcAft>
+              </a:pPr>
+              <a:t>6</a:t>
+            </a:fld>
+            <a:endParaRPr lang="de-DE" noProof="0"/>
+          </a:p>
+        </p:txBody>
+      </p:sp>
+    </p:spTree>
+    <p:extLst>
+      <p:ext uri="{BB962C8B-B14F-4D97-AF65-F5344CB8AC3E}">
+        <p14:creationId xmlns:p14="http://schemas.microsoft.com/office/powerpoint/2010/main" val="4210807430"/>
+      </p:ext>
+    </p:extLst>
+  </p:cSld>
+  <p:clrMapOvr>
+    <a:masterClrMapping/>
+  </p:clrMapOvr>
+</p:sld>
+</file>
+
+<file path=ppt/slides/slide7.xml><?xml version="1.0" encoding="utf-8"?>
+<p:sld xmlns:a="http://schemas.openxmlformats.org/drawingml/2006/main" xmlns:r="http://schemas.openxmlformats.org/officeDocument/2006/relationships" xmlns:p="http://schemas.openxmlformats.org/presentationml/2006/main">
+  <p:cSld>
+    <p:spTree>
+      <p:nvGrpSpPr>
+        <p:cNvPr id="1" name=""/>
+        <p:cNvGrpSpPr/>
+        <p:nvPr/>
+      </p:nvGrpSpPr>
+      <p:grpSpPr>
+        <a:xfrm>
+          <a:off x="0" y="0"/>
+          <a:ext cx="0" cy="0"/>
+          <a:chOff x="0" y="0"/>
+          <a:chExt cx="0" cy="0"/>
+        </a:xfrm>
+      </p:grpSpPr>
       <p:sp>
         <p:nvSpPr>
           <p:cNvPr id="22" name="Datumsplatzhalter 21">
@@ -16190,7 +16709,7 @@
             <a:fld id="{D8DA9DAA-006C-4F4B-980E-E3DF019B24E2}" type="slidenum">
               <a:rPr lang="de-DE" smtClean="0"/>
               <a:pPr rtl="0"/>
-              <a:t>6</a:t>
+              <a:t>7</a:t>
             </a:fld>
             <a:endParaRPr lang="de-DE"/>
           </a:p>
@@ -17178,21 +17697,21 @@
 </file>
 
 <file path=customXml/item1.xml><?xml version="1.0" encoding="utf-8"?>
+<?mso-contentType ?>
+<FormTemplates xmlns="http://schemas.microsoft.com/sharepoint/v3/contenttype/forms">
+  <Display>DocumentLibraryForm</Display>
+  <Edit>DocumentLibraryForm</Edit>
+  <New>DocumentLibraryForm</New>
+</FormTemplates>
+</file>
+
+<file path=customXml/item2.xml><?xml version="1.0" encoding="utf-8"?>
 <p:properties xmlns:p="http://schemas.microsoft.com/office/2006/metadata/properties" xmlns:xsi="http://www.w3.org/2001/XMLSchema-instance" xmlns:pc="http://schemas.microsoft.com/office/infopath/2007/PartnerControls">
   <documentManagement>
     <Status xmlns="71af3243-3dd4-4a8d-8c0d-dd76da1f02a5">Not started</Status>
     <MediaServiceKeyPoints xmlns="71af3243-3dd4-4a8d-8c0d-dd76da1f02a5" xsi:nil="true"/>
   </documentManagement>
 </p:properties>
-</file>
-
-<file path=customXml/item2.xml><?xml version="1.0" encoding="utf-8"?>
-<?mso-contentType ?>
-<FormTemplates xmlns="http://schemas.microsoft.com/sharepoint/v3/contenttype/forms">
-  <Display>DocumentLibraryForm</Display>
-  <Edit>DocumentLibraryForm</Edit>
-  <New>DocumentLibraryForm</New>
-</FormTemplates>
 </file>
 
 <file path=customXml/item3.xml><?xml version="1.0" encoding="utf-8"?>
@@ -17417,19 +17936,19 @@
 </file>
 
 <file path=customXml/itemProps1.xml><?xml version="1.0" encoding="utf-8"?>
+<ds:datastoreItem xmlns:ds="http://schemas.openxmlformats.org/officeDocument/2006/customXml" ds:itemID="{3C8E00D1-8EA3-4E42-801D-0253E1EAFC21}">
+  <ds:schemaRefs>
+    <ds:schemaRef ds:uri="http://schemas.microsoft.com/sharepoint/v3/contenttype/forms"/>
+  </ds:schemaRefs>
+</ds:datastoreItem>
+</file>
+
+<file path=customXml/itemProps2.xml><?xml version="1.0" encoding="utf-8"?>
 <ds:datastoreItem xmlns:ds="http://schemas.openxmlformats.org/officeDocument/2006/customXml" ds:itemID="{99919F73-B6C2-4A43-95E2-833EC48925FE}">
   <ds:schemaRefs>
     <ds:schemaRef ds:uri="http://schemas.microsoft.com/office/2006/metadata/properties"/>
     <ds:schemaRef ds:uri="http://schemas.microsoft.com/office/infopath/2007/PartnerControls"/>
     <ds:schemaRef ds:uri="71af3243-3dd4-4a8d-8c0d-dd76da1f02a5"/>
-  </ds:schemaRefs>
-</ds:datastoreItem>
-</file>
-
-<file path=customXml/itemProps2.xml><?xml version="1.0" encoding="utf-8"?>
-<ds:datastoreItem xmlns:ds="http://schemas.openxmlformats.org/officeDocument/2006/customXml" ds:itemID="{3C8E00D1-8EA3-4E42-801D-0253E1EAFC21}">
-  <ds:schemaRefs>
-    <ds:schemaRef ds:uri="http://schemas.microsoft.com/sharepoint/v3/contenttype/forms"/>
   </ds:schemaRefs>
 </ds:datastoreItem>
 </file>

</xml_diff>

<commit_message>
Revert "Revert "edit hashes""
This reverts commit 618ea9e09ca7eb5521a0f619db22fe11102453ad.
</commit_message>
<xml_diff>
--- a/Präsentation/MultiFlex.pptx
+++ b/Präsentation/MultiFlex.pptx
@@ -1453,7 +1453,7 @@
         </a:bodyPr>
         <a:lstStyle/>
         <a:p>
-          <a:pPr marL="0" lvl="0" indent="0" algn="ctr" defTabSz="666750">
+          <a:pPr marL="0" lvl="0" indent="0" algn="ctr" defTabSz="711200">
             <a:lnSpc>
               <a:spcPct val="100000"/>
             </a:lnSpc>
@@ -1469,7 +1469,7 @@
             </a:defRPr>
           </a:pPr>
           <a:r>
-            <a:rPr lang="de-DE" sz="1500" kern="1200" noProof="0" dirty="0">
+            <a:rPr lang="de-DE" sz="1600" kern="1200" noProof="0" dirty="0">
               <a:solidFill>
                 <a:schemeClr val="bg1"/>
               </a:solidFill>
@@ -1600,7 +1600,7 @@
         </a:bodyPr>
         <a:lstStyle/>
         <a:p>
-          <a:pPr marL="0" lvl="0" indent="0" algn="ctr" defTabSz="666750">
+          <a:pPr marL="0" lvl="0" indent="0" algn="ctr" defTabSz="711200">
             <a:lnSpc>
               <a:spcPct val="100000"/>
             </a:lnSpc>
@@ -1616,7 +1616,7 @@
             </a:defRPr>
           </a:pPr>
           <a:r>
-            <a:rPr lang="de-DE" sz="1500" kern="1200" noProof="0" dirty="0">
+            <a:rPr lang="de-DE" sz="1600" kern="1200" noProof="0" dirty="0">
               <a:solidFill>
                 <a:schemeClr val="bg1"/>
               </a:solidFill>
@@ -1624,13 +1624,13 @@
             <a:t>David Zeilinger</a:t>
           </a:r>
           <a:br>
-            <a:rPr lang="de-DE" sz="1500" kern="1200" noProof="0" dirty="0">
+            <a:rPr lang="de-DE" sz="1600" kern="1200" noProof="0" dirty="0">
               <a:solidFill>
                 <a:schemeClr val="bg1"/>
               </a:solidFill>
             </a:rPr>
           </a:br>
-          <a:endParaRPr lang="de-DE" sz="1500" kern="1200" noProof="0" dirty="0">
+          <a:endParaRPr lang="de-DE" sz="1600" kern="1200" noProof="0" dirty="0">
             <a:solidFill>
               <a:schemeClr val="bg1"/>
             </a:solidFill>
@@ -1759,7 +1759,7 @@
         </a:bodyPr>
         <a:lstStyle/>
         <a:p>
-          <a:pPr marL="0" lvl="0" indent="0" algn="ctr" defTabSz="666750">
+          <a:pPr marL="0" lvl="0" indent="0" algn="ctr" defTabSz="711200">
             <a:lnSpc>
               <a:spcPct val="100000"/>
             </a:lnSpc>
@@ -1775,7 +1775,7 @@
             </a:defRPr>
           </a:pPr>
           <a:r>
-            <a:rPr lang="de-DE" sz="1500" kern="1200" noProof="0" dirty="0">
+            <a:rPr lang="de-DE" sz="1600" kern="1200" noProof="0" dirty="0">
               <a:solidFill>
                 <a:schemeClr val="bg1"/>
               </a:solidFill>
@@ -1783,13 +1783,13 @@
             <a:t>Fabian Schned</a:t>
           </a:r>
           <a:br>
-            <a:rPr lang="de-DE" sz="1500" kern="1200" noProof="0" dirty="0">
+            <a:rPr lang="de-DE" sz="1600" kern="1200" noProof="0" dirty="0">
               <a:solidFill>
                 <a:schemeClr val="bg1"/>
               </a:solidFill>
             </a:rPr>
           </a:br>
-          <a:endParaRPr lang="de-DE" sz="1500" kern="1200" noProof="0" dirty="0">
+          <a:endParaRPr lang="de-DE" sz="1600" kern="1200" noProof="0" dirty="0">
             <a:solidFill>
               <a:schemeClr val="bg1"/>
             </a:solidFill>
@@ -3244,7 +3244,7 @@
           <a:p>
             <a:fld id="{67702A17-7AE3-4B44-889C-4D77A0FC7177}" type="datetime1">
               <a:rPr lang="de-DE" smtClean="0"/>
-              <a:t>30.11.2022</a:t>
+              <a:t>01.12.2022</a:t>
             </a:fld>
             <a:endParaRPr lang="de-DE" dirty="0"/>
           </a:p>
@@ -3424,7 +3424,7 @@
             <a:fld id="{82650ACC-C7DD-445E-BC27-71FC31906D7B}" type="datetime1">
               <a:rPr lang="de-DE" smtClean="0"/>
               <a:pPr/>
-              <a:t>30.11.2022</a:t>
+              <a:t>01.12.2022</a:t>
             </a:fld>
             <a:endParaRPr lang="de-DE" dirty="0"/>
           </a:p>
@@ -16256,8 +16256,8 @@
         </p:blipFill>
         <p:spPr bwMode="auto">
           <a:xfrm>
-            <a:off x="574675" y="1990725"/>
-            <a:ext cx="2279650" cy="2279650"/>
+            <a:off x="658368" y="1987551"/>
+            <a:ext cx="2389632" cy="2389632"/>
           </a:xfrm>
           <a:prstGeom prst="rect">
             <a:avLst/>
@@ -16302,7 +16302,7 @@
         </p:blipFill>
         <p:spPr bwMode="auto">
           <a:xfrm>
-            <a:off x="574675" y="4341813"/>
+            <a:off x="658368" y="4341813"/>
             <a:ext cx="2279650" cy="1666875"/>
           </a:xfrm>
           <a:prstGeom prst="rect">
@@ -16394,8 +16394,8 @@
         </p:blipFill>
         <p:spPr bwMode="auto">
           <a:xfrm>
-            <a:off x="5084763" y="1990725"/>
-            <a:ext cx="4019550" cy="4019550"/>
+            <a:off x="4904141" y="1989139"/>
+            <a:ext cx="4019549" cy="4019549"/>
           </a:xfrm>
           <a:prstGeom prst="rect">
             <a:avLst/>
@@ -16440,7 +16440,7 @@
         </p:blipFill>
         <p:spPr bwMode="auto">
           <a:xfrm>
-            <a:off x="9178925" y="1990725"/>
+            <a:off x="8923690" y="1987552"/>
             <a:ext cx="2166938" cy="2168525"/>
           </a:xfrm>
           <a:prstGeom prst="rect">
@@ -16486,8 +16486,8 @@
         </p:blipFill>
         <p:spPr bwMode="auto">
           <a:xfrm>
-            <a:off x="9178925" y="4232275"/>
-            <a:ext cx="2166938" cy="1778000"/>
+            <a:off x="8739884" y="4079873"/>
+            <a:ext cx="2350744" cy="1928815"/>
           </a:xfrm>
           <a:prstGeom prst="rect">
             <a:avLst/>
@@ -16625,6 +16625,53 @@
           </a:p>
         </p:txBody>
       </p:sp>
+      <p:pic>
+        <p:nvPicPr>
+          <p:cNvPr id="3" name="Picture 2" descr="Bildergebnis für mysql">
+            <a:extLst>
+              <a:ext uri="{FF2B5EF4-FFF2-40B4-BE49-F238E27FC236}">
+                <a16:creationId xmlns:a16="http://schemas.microsoft.com/office/drawing/2014/main" id="{2C578603-1426-4A27-7682-E88F0AABD984}"/>
+              </a:ext>
+            </a:extLst>
+          </p:cNvPr>
+          <p:cNvPicPr>
+            <a:picLocks noChangeAspect="1" noChangeArrowheads="1"/>
+          </p:cNvPicPr>
+          <p:nvPr/>
+        </p:nvPicPr>
+        <p:blipFill>
+          <a:blip r:embed="rId9">
+            <a:extLst>
+              <a:ext uri="{28A0092B-C50C-407E-A947-70E740481C1C}">
+                <a14:useLocalDpi xmlns:a14="http://schemas.microsoft.com/office/drawing/2010/main" val="0"/>
+              </a:ext>
+            </a:extLst>
+          </a:blip>
+          <a:srcRect/>
+          <a:stretch>
+            <a:fillRect/>
+          </a:stretch>
+        </p:blipFill>
+        <p:spPr bwMode="auto">
+          <a:xfrm>
+            <a:off x="8957602" y="541342"/>
+            <a:ext cx="2133026" cy="1471788"/>
+          </a:xfrm>
+          <a:prstGeom prst="rect">
+            <a:avLst/>
+          </a:prstGeom>
+          <a:noFill/>
+          <a:extLst>
+            <a:ext uri="{909E8E84-426E-40DD-AFC4-6F175D3DCCD1}">
+              <a14:hiddenFill xmlns:a14="http://schemas.microsoft.com/office/drawing/2010/main">
+                <a:solidFill>
+                  <a:srgbClr val="FFFFFF"/>
+                </a:solidFill>
+              </a14:hiddenFill>
+            </a:ext>
+          </a:extLst>
+        </p:spPr>
+      </p:pic>
     </p:spTree>
     <p:extLst>
       <p:ext uri="{BB962C8B-B14F-4D97-AF65-F5344CB8AC3E}">
@@ -17697,21 +17744,21 @@
 </file>
 
 <file path=customXml/item1.xml><?xml version="1.0" encoding="utf-8"?>
+<p:properties xmlns:p="http://schemas.microsoft.com/office/2006/metadata/properties" xmlns:xsi="http://www.w3.org/2001/XMLSchema-instance" xmlns:pc="http://schemas.microsoft.com/office/infopath/2007/PartnerControls">
+  <documentManagement>
+    <Status xmlns="71af3243-3dd4-4a8d-8c0d-dd76da1f02a5">Not started</Status>
+    <MediaServiceKeyPoints xmlns="71af3243-3dd4-4a8d-8c0d-dd76da1f02a5" xsi:nil="true"/>
+  </documentManagement>
+</p:properties>
+</file>
+
+<file path=customXml/item2.xml><?xml version="1.0" encoding="utf-8"?>
 <?mso-contentType ?>
 <FormTemplates xmlns="http://schemas.microsoft.com/sharepoint/v3/contenttype/forms">
   <Display>DocumentLibraryForm</Display>
   <Edit>DocumentLibraryForm</Edit>
   <New>DocumentLibraryForm</New>
 </FormTemplates>
-</file>
-
-<file path=customXml/item2.xml><?xml version="1.0" encoding="utf-8"?>
-<p:properties xmlns:p="http://schemas.microsoft.com/office/2006/metadata/properties" xmlns:xsi="http://www.w3.org/2001/XMLSchema-instance" xmlns:pc="http://schemas.microsoft.com/office/infopath/2007/PartnerControls">
-  <documentManagement>
-    <Status xmlns="71af3243-3dd4-4a8d-8c0d-dd76da1f02a5">Not started</Status>
-    <MediaServiceKeyPoints xmlns="71af3243-3dd4-4a8d-8c0d-dd76da1f02a5" xsi:nil="true"/>
-  </documentManagement>
-</p:properties>
 </file>
 
 <file path=customXml/item3.xml><?xml version="1.0" encoding="utf-8"?>
@@ -17936,19 +17983,19 @@
 </file>
 
 <file path=customXml/itemProps1.xml><?xml version="1.0" encoding="utf-8"?>
-<ds:datastoreItem xmlns:ds="http://schemas.openxmlformats.org/officeDocument/2006/customXml" ds:itemID="{3C8E00D1-8EA3-4E42-801D-0253E1EAFC21}">
+<ds:datastoreItem xmlns:ds="http://schemas.openxmlformats.org/officeDocument/2006/customXml" ds:itemID="{99919F73-B6C2-4A43-95E2-833EC48925FE}">
   <ds:schemaRefs>
-    <ds:schemaRef ds:uri="http://schemas.microsoft.com/sharepoint/v3/contenttype/forms"/>
+    <ds:schemaRef ds:uri="http://schemas.microsoft.com/office/2006/metadata/properties"/>
+    <ds:schemaRef ds:uri="http://schemas.microsoft.com/office/infopath/2007/PartnerControls"/>
+    <ds:schemaRef ds:uri="71af3243-3dd4-4a8d-8c0d-dd76da1f02a5"/>
   </ds:schemaRefs>
 </ds:datastoreItem>
 </file>
 
 <file path=customXml/itemProps2.xml><?xml version="1.0" encoding="utf-8"?>
-<ds:datastoreItem xmlns:ds="http://schemas.openxmlformats.org/officeDocument/2006/customXml" ds:itemID="{99919F73-B6C2-4A43-95E2-833EC48925FE}">
+<ds:datastoreItem xmlns:ds="http://schemas.openxmlformats.org/officeDocument/2006/customXml" ds:itemID="{3C8E00D1-8EA3-4E42-801D-0253E1EAFC21}">
   <ds:schemaRefs>
-    <ds:schemaRef ds:uri="http://schemas.microsoft.com/office/2006/metadata/properties"/>
-    <ds:schemaRef ds:uri="http://schemas.microsoft.com/office/infopath/2007/PartnerControls"/>
-    <ds:schemaRef ds:uri="71af3243-3dd4-4a8d-8c0d-dd76da1f02a5"/>
+    <ds:schemaRef ds:uri="http://schemas.microsoft.com/sharepoint/v3/contenttype/forms"/>
   </ds:schemaRefs>
 </ds:datastoreItem>
 </file>

</xml_diff>